<commit_message>
fixed typos, rewrote milestone 2 report, inserted milestone 1 report
</commit_message>
<xml_diff>
--- a/presentation.pptx
+++ b/presentation.pptx
@@ -320,7 +320,7 @@
           <a:p>
             <a:fld id="{D1F73057-5EC8-4DB3-A4E5-411352F4B55A}" type="datetimeFigureOut">
               <a:rPr lang="el-GR" smtClean="0"/>
-              <a:t>7/12/2017</a:t>
+              <a:t>10/12/2017</a:t>
             </a:fld>
             <a:endParaRPr lang="el-GR"/>
           </a:p>
@@ -595,7 +595,7 @@
           <a:p>
             <a:fld id="{D1F73057-5EC8-4DB3-A4E5-411352F4B55A}" type="datetimeFigureOut">
               <a:rPr lang="el-GR" smtClean="0"/>
-              <a:t>7/12/2017</a:t>
+              <a:t>10/12/2017</a:t>
             </a:fld>
             <a:endParaRPr lang="el-GR"/>
           </a:p>
@@ -789,7 +789,7 @@
           <a:p>
             <a:fld id="{D1F73057-5EC8-4DB3-A4E5-411352F4B55A}" type="datetimeFigureOut">
               <a:rPr lang="el-GR" smtClean="0"/>
-              <a:t>7/12/2017</a:t>
+              <a:t>10/12/2017</a:t>
             </a:fld>
             <a:endParaRPr lang="el-GR"/>
           </a:p>
@@ -1062,7 +1062,7 @@
           <a:p>
             <a:fld id="{D1F73057-5EC8-4DB3-A4E5-411352F4B55A}" type="datetimeFigureOut">
               <a:rPr lang="el-GR" smtClean="0"/>
-              <a:t>7/12/2017</a:t>
+              <a:t>10/12/2017</a:t>
             </a:fld>
             <a:endParaRPr lang="el-GR"/>
           </a:p>
@@ -1403,7 +1403,7 @@
           <a:p>
             <a:fld id="{D1F73057-5EC8-4DB3-A4E5-411352F4B55A}" type="datetimeFigureOut">
               <a:rPr lang="el-GR" smtClean="0"/>
-              <a:t>7/12/2017</a:t>
+              <a:t>10/12/2017</a:t>
             </a:fld>
             <a:endParaRPr lang="el-GR"/>
           </a:p>
@@ -2026,7 +2026,7 @@
           <a:p>
             <a:fld id="{D1F73057-5EC8-4DB3-A4E5-411352F4B55A}" type="datetimeFigureOut">
               <a:rPr lang="el-GR" smtClean="0"/>
-              <a:t>7/12/2017</a:t>
+              <a:t>10/12/2017</a:t>
             </a:fld>
             <a:endParaRPr lang="el-GR"/>
           </a:p>
@@ -2886,7 +2886,7 @@
           <a:p>
             <a:fld id="{D1F73057-5EC8-4DB3-A4E5-411352F4B55A}" type="datetimeFigureOut">
               <a:rPr lang="el-GR" smtClean="0"/>
-              <a:t>7/12/2017</a:t>
+              <a:t>10/12/2017</a:t>
             </a:fld>
             <a:endParaRPr lang="el-GR"/>
           </a:p>
@@ -3056,7 +3056,7 @@
           <a:p>
             <a:fld id="{D1F73057-5EC8-4DB3-A4E5-411352F4B55A}" type="datetimeFigureOut">
               <a:rPr lang="el-GR" smtClean="0"/>
-              <a:t>7/12/2017</a:t>
+              <a:t>10/12/2017</a:t>
             </a:fld>
             <a:endParaRPr lang="el-GR"/>
           </a:p>
@@ -3236,7 +3236,7 @@
           <a:p>
             <a:fld id="{D1F73057-5EC8-4DB3-A4E5-411352F4B55A}" type="datetimeFigureOut">
               <a:rPr lang="el-GR" smtClean="0"/>
-              <a:t>7/12/2017</a:t>
+              <a:t>10/12/2017</a:t>
             </a:fld>
             <a:endParaRPr lang="el-GR"/>
           </a:p>
@@ -3406,7 +3406,7 @@
           <a:p>
             <a:fld id="{D1F73057-5EC8-4DB3-A4E5-411352F4B55A}" type="datetimeFigureOut">
               <a:rPr lang="el-GR" smtClean="0"/>
-              <a:t>7/12/2017</a:t>
+              <a:t>10/12/2017</a:t>
             </a:fld>
             <a:endParaRPr lang="el-GR"/>
           </a:p>
@@ -3653,7 +3653,7 @@
           <a:p>
             <a:fld id="{D1F73057-5EC8-4DB3-A4E5-411352F4B55A}" type="datetimeFigureOut">
               <a:rPr lang="el-GR" smtClean="0"/>
-              <a:t>7/12/2017</a:t>
+              <a:t>10/12/2017</a:t>
             </a:fld>
             <a:endParaRPr lang="el-GR"/>
           </a:p>
@@ -3945,7 +3945,7 @@
           <a:p>
             <a:fld id="{D1F73057-5EC8-4DB3-A4E5-411352F4B55A}" type="datetimeFigureOut">
               <a:rPr lang="el-GR" smtClean="0"/>
-              <a:t>7/12/2017</a:t>
+              <a:t>10/12/2017</a:t>
             </a:fld>
             <a:endParaRPr lang="el-GR"/>
           </a:p>
@@ -4389,7 +4389,7 @@
           <a:p>
             <a:fld id="{D1F73057-5EC8-4DB3-A4E5-411352F4B55A}" type="datetimeFigureOut">
               <a:rPr lang="el-GR" smtClean="0"/>
-              <a:t>7/12/2017</a:t>
+              <a:t>10/12/2017</a:t>
             </a:fld>
             <a:endParaRPr lang="el-GR"/>
           </a:p>
@@ -4507,7 +4507,7 @@
           <a:p>
             <a:fld id="{D1F73057-5EC8-4DB3-A4E5-411352F4B55A}" type="datetimeFigureOut">
               <a:rPr lang="el-GR" smtClean="0"/>
-              <a:t>7/12/2017</a:t>
+              <a:t>10/12/2017</a:t>
             </a:fld>
             <a:endParaRPr lang="el-GR"/>
           </a:p>
@@ -4602,7 +4602,7 @@
           <a:p>
             <a:fld id="{D1F73057-5EC8-4DB3-A4E5-411352F4B55A}" type="datetimeFigureOut">
               <a:rPr lang="el-GR" smtClean="0"/>
-              <a:t>7/12/2017</a:t>
+              <a:t>10/12/2017</a:t>
             </a:fld>
             <a:endParaRPr lang="el-GR"/>
           </a:p>
@@ -4881,7 +4881,7 @@
           <a:p>
             <a:fld id="{D1F73057-5EC8-4DB3-A4E5-411352F4B55A}" type="datetimeFigureOut">
               <a:rPr lang="el-GR" smtClean="0"/>
-              <a:t>7/12/2017</a:t>
+              <a:t>10/12/2017</a:t>
             </a:fld>
             <a:endParaRPr lang="el-GR"/>
           </a:p>
@@ -5156,7 +5156,7 @@
           <a:p>
             <a:fld id="{D1F73057-5EC8-4DB3-A4E5-411352F4B55A}" type="datetimeFigureOut">
               <a:rPr lang="el-GR" smtClean="0"/>
-              <a:t>7/12/2017</a:t>
+              <a:t>10/12/2017</a:t>
             </a:fld>
             <a:endParaRPr lang="el-GR"/>
           </a:p>
@@ -5585,7 +5585,7 @@
           <a:p>
             <a:fld id="{D1F73057-5EC8-4DB3-A4E5-411352F4B55A}" type="datetimeFigureOut">
               <a:rPr lang="el-GR" smtClean="0"/>
-              <a:t>7/12/2017</a:t>
+              <a:t>10/12/2017</a:t>
             </a:fld>
             <a:endParaRPr lang="el-GR"/>
           </a:p>
@@ -8483,7 +8483,7 @@
             </a:r>
             <a:r>
               <a:rPr lang="el-GR" dirty="0"/>
-              <a:t>αποτελείτε από ένα μεγάλο </a:t>
+              <a:t>αποτελείται από ένα μεγάλο </a:t>
             </a:r>
             <a:r>
               <a:rPr lang="en-US" dirty="0"/>

</xml_diff>